<commit_message>
adding notes for tonight's lecture
</commit_message>
<xml_diff>
--- a/lectures/Elicitation.pptx
+++ b/lectures/Elicitation.pptx
@@ -154,7 +154,7 @@
   <pc:docChgLst>
     <pc:chgData name="Michaeljon Miller" userId="c575fe5cddd8b8cf" providerId="LiveId" clId="{4F588510-D35B-8E48-87A9-C94FB4467BFD}"/>
     <pc:docChg chg="undo custSel addSld modSld">
-      <pc:chgData name="Michaeljon Miller" userId="c575fe5cddd8b8cf" providerId="LiveId" clId="{4F588510-D35B-8E48-87A9-C94FB4467BFD}" dt="2018-10-11T00:53:38.750" v="3662" actId="20577"/>
+      <pc:chgData name="Michaeljon Miller" userId="c575fe5cddd8b8cf" providerId="LiveId" clId="{4F588510-D35B-8E48-87A9-C94FB4467BFD}" dt="2018-10-14T14:30:31.171" v="3674" actId="20577"/>
       <pc:docMkLst>
         <pc:docMk/>
       </pc:docMkLst>
@@ -362,7 +362,7 @@
         </pc:spChg>
       </pc:sldChg>
       <pc:sldChg chg="modSp modAnim">
-        <pc:chgData name="Michaeljon Miller" userId="c575fe5cddd8b8cf" providerId="LiveId" clId="{4F588510-D35B-8E48-87A9-C94FB4467BFD}" dt="2018-10-11T00:41:05.320" v="1910" actId="13822"/>
+        <pc:chgData name="Michaeljon Miller" userId="c575fe5cddd8b8cf" providerId="LiveId" clId="{4F588510-D35B-8E48-87A9-C94FB4467BFD}" dt="2018-10-14T14:30:31.171" v="3674" actId="20577"/>
         <pc:sldMkLst>
           <pc:docMk/>
           <pc:sldMk cId="1029403735" sldId="299"/>
@@ -405,6 +405,14 @@
             <pc:docMk/>
             <pc:sldMk cId="1029403735" sldId="299"/>
             <ac:spMk id="9" creationId="{00000000-0000-0000-0000-000000000000}"/>
+          </ac:spMkLst>
+        </pc:spChg>
+        <pc:spChg chg="mod">
+          <ac:chgData name="Michaeljon Miller" userId="c575fe5cddd8b8cf" providerId="LiveId" clId="{4F588510-D35B-8E48-87A9-C94FB4467BFD}" dt="2018-10-14T14:30:31.171" v="3674" actId="20577"/>
+          <ac:spMkLst>
+            <pc:docMk/>
+            <pc:sldMk cId="1029403735" sldId="299"/>
+            <ac:spMk id="33" creationId="{00000000-0000-0000-0000-000000000000}"/>
           </ac:spMkLst>
         </pc:spChg>
       </pc:sldChg>
@@ -931,7 +939,7 @@
           <a:p>
             <a:fld id="{339F7D39-C0A6-FE4D-ACB4-D996C221FDD6}" type="datetimeFigureOut">
               <a:rPr lang="en-US" smtClean="0"/>
-              <a:t>10/7/18</a:t>
+              <a:t>10/14/18</a:t>
             </a:fld>
             <a:endParaRPr lang="en-US"/>
           </a:p>
@@ -1327,7 +1335,7 @@
           <a:p>
             <a:fld id="{F3487D90-B7F6-BF4B-819F-FA7E350C977E}" type="datetimeFigureOut">
               <a:rPr lang="en-US" smtClean="0"/>
-              <a:t>10/7/18</a:t>
+              <a:t>10/14/18</a:t>
             </a:fld>
             <a:endParaRPr lang="en-US"/>
           </a:p>
@@ -1495,7 +1503,7 @@
           <a:p>
             <a:fld id="{F3487D90-B7F6-BF4B-819F-FA7E350C977E}" type="datetimeFigureOut">
               <a:rPr lang="en-US" smtClean="0"/>
-              <a:t>10/7/18</a:t>
+              <a:t>10/14/18</a:t>
             </a:fld>
             <a:endParaRPr lang="en-US"/>
           </a:p>
@@ -1673,7 +1681,7 @@
           <a:p>
             <a:fld id="{F3487D90-B7F6-BF4B-819F-FA7E350C977E}" type="datetimeFigureOut">
               <a:rPr lang="en-US" smtClean="0"/>
-              <a:t>10/7/18</a:t>
+              <a:t>10/14/18</a:t>
             </a:fld>
             <a:endParaRPr lang="en-US"/>
           </a:p>
@@ -1841,7 +1849,7 @@
           <a:p>
             <a:fld id="{F3487D90-B7F6-BF4B-819F-FA7E350C977E}" type="datetimeFigureOut">
               <a:rPr lang="en-US" smtClean="0"/>
-              <a:t>10/7/18</a:t>
+              <a:t>10/14/18</a:t>
             </a:fld>
             <a:endParaRPr lang="en-US"/>
           </a:p>
@@ -2086,7 +2094,7 @@
           <a:p>
             <a:fld id="{F3487D90-B7F6-BF4B-819F-FA7E350C977E}" type="datetimeFigureOut">
               <a:rPr lang="en-US" smtClean="0"/>
-              <a:t>10/7/18</a:t>
+              <a:t>10/14/18</a:t>
             </a:fld>
             <a:endParaRPr lang="en-US"/>
           </a:p>
@@ -2315,7 +2323,7 @@
           <a:p>
             <a:fld id="{F3487D90-B7F6-BF4B-819F-FA7E350C977E}" type="datetimeFigureOut">
               <a:rPr lang="en-US" smtClean="0"/>
-              <a:t>10/7/18</a:t>
+              <a:t>10/14/18</a:t>
             </a:fld>
             <a:endParaRPr lang="en-US"/>
           </a:p>
@@ -2679,7 +2687,7 @@
           <a:p>
             <a:fld id="{F3487D90-B7F6-BF4B-819F-FA7E350C977E}" type="datetimeFigureOut">
               <a:rPr lang="en-US" smtClean="0"/>
-              <a:t>10/7/18</a:t>
+              <a:t>10/14/18</a:t>
             </a:fld>
             <a:endParaRPr lang="en-US"/>
           </a:p>
@@ -2796,7 +2804,7 @@
           <a:p>
             <a:fld id="{F3487D90-B7F6-BF4B-819F-FA7E350C977E}" type="datetimeFigureOut">
               <a:rPr lang="en-US" smtClean="0"/>
-              <a:t>10/7/18</a:t>
+              <a:t>10/14/18</a:t>
             </a:fld>
             <a:endParaRPr lang="en-US"/>
           </a:p>
@@ -2891,7 +2899,7 @@
           <a:p>
             <a:fld id="{F3487D90-B7F6-BF4B-819F-FA7E350C977E}" type="datetimeFigureOut">
               <a:rPr lang="en-US" smtClean="0"/>
-              <a:t>10/7/18</a:t>
+              <a:t>10/14/18</a:t>
             </a:fld>
             <a:endParaRPr lang="en-US"/>
           </a:p>
@@ -3166,7 +3174,7 @@
           <a:p>
             <a:fld id="{F3487D90-B7F6-BF4B-819F-FA7E350C977E}" type="datetimeFigureOut">
               <a:rPr lang="en-US" smtClean="0"/>
-              <a:t>10/7/18</a:t>
+              <a:t>10/14/18</a:t>
             </a:fld>
             <a:endParaRPr lang="en-US"/>
           </a:p>
@@ -3418,7 +3426,7 @@
           <a:p>
             <a:fld id="{F3487D90-B7F6-BF4B-819F-FA7E350C977E}" type="datetimeFigureOut">
               <a:rPr lang="en-US" smtClean="0"/>
-              <a:t>10/7/18</a:t>
+              <a:t>10/14/18</a:t>
             </a:fld>
             <a:endParaRPr lang="en-US"/>
           </a:p>
@@ -3629,7 +3637,7 @@
           <a:p>
             <a:fld id="{F3487D90-B7F6-BF4B-819F-FA7E350C977E}" type="datetimeFigureOut">
               <a:rPr lang="en-US" smtClean="0"/>
-              <a:t>10/7/18</a:t>
+              <a:t>10/14/18</a:t>
             </a:fld>
             <a:endParaRPr lang="en-US"/>
           </a:p>
@@ -8108,8 +8116,8 @@
           <a:lstStyle/>
           <a:p>
             <a:r>
-              <a:rPr lang="en-US"/>
-              <a:t>conversations</a:t>
+              <a:rPr lang="en-US" dirty="0"/>
+              <a:t>confirmation</a:t>
             </a:r>
           </a:p>
         </p:txBody>

</xml_diff>